<commit_message>
Update App Prediction Presentation.pptx
</commit_message>
<xml_diff>
--- a/App Prediction Presentation.pptx
+++ b/App Prediction Presentation.pptx
@@ -12,6 +12,7 @@
     <p:sldId id="263" r:id="rId6"/>
     <p:sldId id="265" r:id="rId7"/>
     <p:sldId id="266" r:id="rId8"/>
+    <p:sldId id="267" r:id="rId9"/>
   </p:sldIdLst>
   <p:sldSz cx="12192000" cy="6858000"/>
   <p:notesSz cx="6858000" cy="9144000"/>
@@ -5536,12 +5537,14 @@
           </a:xfrm>
         </p:spPr>
         <p:txBody>
-          <a:bodyPr/>
+          <a:bodyPr>
+            <a:normAutofit fontScale="90000"/>
+          </a:bodyPr>
           <a:lstStyle/>
           <a:p>
             <a:r>
               <a:rPr lang="en-US" dirty="0"/>
-              <a:t>Total Ratings count summary</a:t>
+              <a:t>Train Dataset: Total Ratings count summary</a:t>
             </a:r>
           </a:p>
         </p:txBody>
@@ -6262,13 +6265,8 @@
             </a:r>
             <a:r>
               <a:rPr lang="en-US" dirty="0"/>
-              <a:t> Q and median are higher than the ratings summary but the rest of the </a:t>
-            </a:r>
-            <a:r>
-              <a:rPr lang="en-US"/>
-              <a:t>results mirror that of the ratings</a:t>
-            </a:r>
-            <a:endParaRPr lang="en-US" dirty="0"/>
+              <a:t> Q and median are higher than the ratings summary but the rest of the results mirror that of the train’s dataset</a:t>
+            </a:r>
           </a:p>
           <a:p>
             <a:endParaRPr lang="en-US" dirty="0"/>
@@ -6309,6 +6307,414 @@
     <p:extLst>
       <p:ext uri="{BB962C8B-B14F-4D97-AF65-F5344CB8AC3E}">
         <p14:creationId xmlns:p14="http://schemas.microsoft.com/office/powerpoint/2010/main" val="3141235019"/>
+      </p:ext>
+    </p:extLst>
+  </p:cSld>
+  <p:clrMapOvr>
+    <a:masterClrMapping/>
+  </p:clrMapOvr>
+</p:sld>
+</file>
+
+<file path=ppt/slides/slide8.xml><?xml version="1.0" encoding="utf-8"?>
+<p:sld xmlns:a="http://schemas.openxmlformats.org/drawingml/2006/main" xmlns:r="http://schemas.openxmlformats.org/officeDocument/2006/relationships" xmlns:p="http://schemas.openxmlformats.org/presentationml/2006/main">
+  <p:cSld>
+    <p:spTree>
+      <p:nvGrpSpPr>
+        <p:cNvPr id="1" name=""/>
+        <p:cNvGrpSpPr/>
+        <p:nvPr/>
+      </p:nvGrpSpPr>
+      <p:grpSpPr>
+        <a:xfrm>
+          <a:off x="0" y="0"/>
+          <a:ext cx="0" cy="0"/>
+          <a:chOff x="0" y="0"/>
+          <a:chExt cx="0" cy="0"/>
+        </a:xfrm>
+      </p:grpSpPr>
+      <p:sp>
+        <p:nvSpPr>
+          <p:cNvPr id="2" name="Title 1">
+            <a:extLst>
+              <a:ext uri="{FF2B5EF4-FFF2-40B4-BE49-F238E27FC236}">
+                <a16:creationId xmlns:a16="http://schemas.microsoft.com/office/drawing/2014/main" id="{65A507BB-BD20-D247-8FFE-8DE4F21C77B6}"/>
+              </a:ext>
+            </a:extLst>
+          </p:cNvPr>
+          <p:cNvSpPr>
+            <a:spLocks noGrp="1"/>
+          </p:cNvSpPr>
+          <p:nvPr>
+            <p:ph type="title"/>
+          </p:nvPr>
+        </p:nvSpPr>
+        <p:spPr>
+          <a:xfrm>
+            <a:off x="1449217" y="804889"/>
+            <a:ext cx="8158609" cy="878137"/>
+          </a:xfrm>
+        </p:spPr>
+        <p:txBody>
+          <a:bodyPr/>
+          <a:lstStyle/>
+          <a:p>
+            <a:r>
+              <a:rPr lang="en-US" dirty="0"/>
+              <a:t>Zero inflated model summary</a:t>
+            </a:r>
+          </a:p>
+        </p:txBody>
+      </p:sp>
+      <p:graphicFrame>
+        <p:nvGraphicFramePr>
+          <p:cNvPr id="5" name="Content Placeholder 4">
+            <a:extLst>
+              <a:ext uri="{FF2B5EF4-FFF2-40B4-BE49-F238E27FC236}">
+                <a16:creationId xmlns:a16="http://schemas.microsoft.com/office/drawing/2014/main" id="{807D5F69-65C9-FC4D-A38D-06EC137AC8CA}"/>
+              </a:ext>
+            </a:extLst>
+          </p:cNvPr>
+          <p:cNvGraphicFramePr>
+            <a:graphicFrameLocks noGrp="1"/>
+          </p:cNvGraphicFramePr>
+          <p:nvPr>
+            <p:ph sz="half" idx="1"/>
+            <p:extLst>
+              <p:ext uri="{D42A27DB-BD31-4B8C-83A1-F6EECF244321}">
+                <p14:modId xmlns:p14="http://schemas.microsoft.com/office/powerpoint/2010/main" val="1430445835"/>
+              </p:ext>
+            </p:extLst>
+          </p:nvPr>
+        </p:nvGraphicFramePr>
+        <p:xfrm>
+          <a:off x="715617" y="2060112"/>
+          <a:ext cx="6347791" cy="924574"/>
+        </p:xfrm>
+        <a:graphic>
+          <a:graphicData uri="http://schemas.openxmlformats.org/drawingml/2006/table">
+            <a:tbl>
+              <a:tblPr firstRow="1" bandRow="1">
+                <a:tableStyleId>{93296810-A885-4BE3-A3E7-6D5BEEA58F35}</a:tableStyleId>
+              </a:tblPr>
+              <a:tblGrid>
+                <a:gridCol w="963807">
+                  <a:extLst>
+                    <a:ext uri="{9D8B030D-6E8A-4147-A177-3AD203B41FA5}">
+                      <a16:colId xmlns:a16="http://schemas.microsoft.com/office/drawing/2014/main" val="2251034385"/>
+                    </a:ext>
+                  </a:extLst>
+                </a:gridCol>
+                <a:gridCol w="851716">
+                  <a:extLst>
+                    <a:ext uri="{9D8B030D-6E8A-4147-A177-3AD203B41FA5}">
+                      <a16:colId xmlns:a16="http://schemas.microsoft.com/office/drawing/2014/main" val="2922715774"/>
+                    </a:ext>
+                  </a:extLst>
+                </a:gridCol>
+                <a:gridCol w="1315037">
+                  <a:extLst>
+                    <a:ext uri="{9D8B030D-6E8A-4147-A177-3AD203B41FA5}">
+                      <a16:colId xmlns:a16="http://schemas.microsoft.com/office/drawing/2014/main" val="1685585629"/>
+                    </a:ext>
+                  </a:extLst>
+                </a:gridCol>
+                <a:gridCol w="1043875">
+                  <a:extLst>
+                    <a:ext uri="{9D8B030D-6E8A-4147-A177-3AD203B41FA5}">
+                      <a16:colId xmlns:a16="http://schemas.microsoft.com/office/drawing/2014/main" val="2698248143"/>
+                    </a:ext>
+                  </a:extLst>
+                </a:gridCol>
+                <a:gridCol w="993913">
+                  <a:extLst>
+                    <a:ext uri="{9D8B030D-6E8A-4147-A177-3AD203B41FA5}">
+                      <a16:colId xmlns:a16="http://schemas.microsoft.com/office/drawing/2014/main" val="186175513"/>
+                    </a:ext>
+                  </a:extLst>
+                </a:gridCol>
+                <a:gridCol w="1179443">
+                  <a:extLst>
+                    <a:ext uri="{9D8B030D-6E8A-4147-A177-3AD203B41FA5}">
+                      <a16:colId xmlns:a16="http://schemas.microsoft.com/office/drawing/2014/main" val="1368935118"/>
+                    </a:ext>
+                  </a:extLst>
+                </a:gridCol>
+              </a:tblGrid>
+              <a:tr h="319323">
+                <a:tc>
+                  <a:txBody>
+                    <a:bodyPr/>
+                    <a:lstStyle/>
+                    <a:p>
+                      <a:r>
+                        <a:rPr lang="en-US" dirty="0"/>
+                        <a:t>Min</a:t>
+                      </a:r>
+                    </a:p>
+                  </a:txBody>
+                  <a:tcPr/>
+                </a:tc>
+                <a:tc>
+                  <a:txBody>
+                    <a:bodyPr/>
+                    <a:lstStyle/>
+                    <a:p>
+                      <a:r>
+                        <a:rPr lang="en-US" dirty="0"/>
+                        <a:t>1</a:t>
+                      </a:r>
+                      <a:r>
+                        <a:rPr lang="en-US" baseline="30000" dirty="0"/>
+                        <a:t>st</a:t>
+                      </a:r>
+                      <a:r>
+                        <a:rPr lang="en-US" dirty="0"/>
+                        <a:t> Q</a:t>
+                      </a:r>
+                    </a:p>
+                  </a:txBody>
+                  <a:tcPr/>
+                </a:tc>
+                <a:tc>
+                  <a:txBody>
+                    <a:bodyPr/>
+                    <a:lstStyle/>
+                    <a:p>
+                      <a:r>
+                        <a:rPr lang="en-US" dirty="0"/>
+                        <a:t>Median </a:t>
+                      </a:r>
+                    </a:p>
+                  </a:txBody>
+                  <a:tcPr/>
+                </a:tc>
+                <a:tc>
+                  <a:txBody>
+                    <a:bodyPr/>
+                    <a:lstStyle/>
+                    <a:p>
+                      <a:r>
+                        <a:rPr lang="en-US" dirty="0"/>
+                        <a:t>Mean </a:t>
+                      </a:r>
+                    </a:p>
+                  </a:txBody>
+                  <a:tcPr/>
+                </a:tc>
+                <a:tc>
+                  <a:txBody>
+                    <a:bodyPr/>
+                    <a:lstStyle/>
+                    <a:p>
+                      <a:r>
+                        <a:rPr lang="en-US" dirty="0"/>
+                        <a:t>3</a:t>
+                      </a:r>
+                      <a:r>
+                        <a:rPr lang="en-US" baseline="30000" dirty="0"/>
+                        <a:t>rd</a:t>
+                      </a:r>
+                      <a:r>
+                        <a:rPr lang="en-US" dirty="0"/>
+                        <a:t> Q</a:t>
+                      </a:r>
+                    </a:p>
+                  </a:txBody>
+                  <a:tcPr/>
+                </a:tc>
+                <a:tc>
+                  <a:txBody>
+                    <a:bodyPr/>
+                    <a:lstStyle/>
+                    <a:p>
+                      <a:r>
+                        <a:rPr lang="en-US" dirty="0"/>
+                        <a:t>Max</a:t>
+                      </a:r>
+                    </a:p>
+                  </a:txBody>
+                  <a:tcPr/>
+                </a:tc>
+                <a:extLst>
+                  <a:ext uri="{0D108BD9-81ED-4DB2-BD59-A6C34878D82A}">
+                    <a16:rowId xmlns:a16="http://schemas.microsoft.com/office/drawing/2014/main" val="503003112"/>
+                  </a:ext>
+                </a:extLst>
+              </a:tr>
+              <a:tr h="558814">
+                <a:tc>
+                  <a:txBody>
+                    <a:bodyPr/>
+                    <a:lstStyle/>
+                    <a:p>
+                      <a:r>
+                        <a:rPr lang="en-US" dirty="0"/>
+                        <a:t>0</a:t>
+                      </a:r>
+                    </a:p>
+                  </a:txBody>
+                  <a:tcPr/>
+                </a:tc>
+                <a:tc>
+                  <a:txBody>
+                    <a:bodyPr/>
+                    <a:lstStyle/>
+                    <a:p>
+                      <a:r>
+                        <a:rPr lang="en-US" dirty="0"/>
+                        <a:t>48.4</a:t>
+                      </a:r>
+                    </a:p>
+                  </a:txBody>
+                  <a:tcPr/>
+                </a:tc>
+                <a:tc>
+                  <a:txBody>
+                    <a:bodyPr/>
+                    <a:lstStyle/>
+                    <a:p>
+                      <a:r>
+                        <a:rPr lang="en-US" dirty="0"/>
+                        <a:t>1379.9</a:t>
+                      </a:r>
+                    </a:p>
+                  </a:txBody>
+                  <a:tcPr/>
+                </a:tc>
+                <a:tc>
+                  <a:txBody>
+                    <a:bodyPr/>
+                    <a:lstStyle/>
+                    <a:p>
+                      <a:r>
+                        <a:rPr lang="en-US" dirty="0"/>
+                        <a:t>13470.6 </a:t>
+                      </a:r>
+                    </a:p>
+                  </a:txBody>
+                  <a:tcPr/>
+                </a:tc>
+                <a:tc>
+                  <a:txBody>
+                    <a:bodyPr/>
+                    <a:lstStyle/>
+                    <a:p>
+                      <a:r>
+                        <a:rPr lang="en-US" dirty="0"/>
+                        <a:t>24029.8</a:t>
+                      </a:r>
+                    </a:p>
+                  </a:txBody>
+                  <a:tcPr/>
+                </a:tc>
+                <a:tc>
+                  <a:txBody>
+                    <a:bodyPr/>
+                    <a:lstStyle/>
+                    <a:p>
+                      <a:r>
+                        <a:rPr lang="en-US" dirty="0"/>
+                        <a:t>577129.3</a:t>
+                      </a:r>
+                    </a:p>
+                  </a:txBody>
+                  <a:tcPr/>
+                </a:tc>
+                <a:extLst>
+                  <a:ext uri="{0D108BD9-81ED-4DB2-BD59-A6C34878D82A}">
+                    <a16:rowId xmlns:a16="http://schemas.microsoft.com/office/drawing/2014/main" val="2238281903"/>
+                  </a:ext>
+                </a:extLst>
+              </a:tr>
+            </a:tbl>
+          </a:graphicData>
+        </a:graphic>
+      </p:graphicFrame>
+      <p:sp>
+        <p:nvSpPr>
+          <p:cNvPr id="4" name="Content Placeholder 3">
+            <a:extLst>
+              <a:ext uri="{FF2B5EF4-FFF2-40B4-BE49-F238E27FC236}">
+                <a16:creationId xmlns:a16="http://schemas.microsoft.com/office/drawing/2014/main" id="{2B519F29-5BF0-E943-B0EB-7170E6FFC389}"/>
+              </a:ext>
+            </a:extLst>
+          </p:cNvPr>
+          <p:cNvSpPr>
+            <a:spLocks noGrp="1"/>
+          </p:cNvSpPr>
+          <p:nvPr>
+            <p:ph sz="half" idx="2"/>
+          </p:nvPr>
+        </p:nvSpPr>
+        <p:spPr>
+          <a:xfrm>
+            <a:off x="7063409" y="2060112"/>
+            <a:ext cx="3995514" cy="3398750"/>
+          </a:xfrm>
+        </p:spPr>
+        <p:txBody>
+          <a:bodyPr>
+            <a:normAutofit/>
+          </a:bodyPr>
+          <a:lstStyle/>
+          <a:p>
+            <a:r>
+              <a:rPr lang="en-US" dirty="0"/>
+              <a:t>Zero inflated Poisson regression is used to model count data that has an excess amount of zeroes</a:t>
+            </a:r>
+          </a:p>
+          <a:p>
+            <a:r>
+              <a:rPr lang="en-US" dirty="0"/>
+              <a:t>Zero inflated results are less skewed than Poisson’s and train’s </a:t>
+            </a:r>
+          </a:p>
+          <a:p>
+            <a:r>
+              <a:rPr lang="en-US" dirty="0"/>
+              <a:t>Max result is significantly lower than the max from the train’s dataset</a:t>
+            </a:r>
+          </a:p>
+          <a:p>
+            <a:endParaRPr lang="en-US" dirty="0"/>
+          </a:p>
+        </p:txBody>
+      </p:sp>
+      <p:pic>
+        <p:nvPicPr>
+          <p:cNvPr id="7" name="Picture 6" descr="A screenshot of a cell phone&#10;&#10;Description automatically generated">
+            <a:extLst>
+              <a:ext uri="{FF2B5EF4-FFF2-40B4-BE49-F238E27FC236}">
+                <a16:creationId xmlns:a16="http://schemas.microsoft.com/office/drawing/2014/main" id="{23DAF23F-6E6E-D048-ABDC-E3473C451DBB}"/>
+              </a:ext>
+            </a:extLst>
+          </p:cNvPr>
+          <p:cNvPicPr>
+            <a:picLocks noChangeAspect="1"/>
+          </p:cNvPicPr>
+          <p:nvPr/>
+        </p:nvPicPr>
+        <p:blipFill>
+          <a:blip r:embed="rId2"/>
+          <a:stretch>
+            <a:fillRect/>
+          </a:stretch>
+        </p:blipFill>
+        <p:spPr>
+          <a:xfrm>
+            <a:off x="2117862" y="3190185"/>
+            <a:ext cx="3543300" cy="2730500"/>
+          </a:xfrm>
+          <a:prstGeom prst="rect">
+            <a:avLst/>
+          </a:prstGeom>
+        </p:spPr>
+      </p:pic>
+    </p:spTree>
+    <p:extLst>
+      <p:ext uri="{BB962C8B-B14F-4D97-AF65-F5344CB8AC3E}">
+        <p14:creationId xmlns:p14="http://schemas.microsoft.com/office/powerpoint/2010/main" val="2713895545"/>
       </p:ext>
     </p:extLst>
   </p:cSld>

</xml_diff>